<commit_message>
minor updates to type face and front page
</commit_message>
<xml_diff>
--- a/slides.pptx
+++ b/slides.pptx
@@ -7313,7 +7313,7 @@
                   </a:outerShdw>
                 </a:effectLst>
               </a:rPr>
-              <a:t>All code is guilty until proven innocent</a:t>
+              <a:t>“All code is guilty until proven innocent”</a:t>
             </a:r>
             <a:endParaRPr lang="en-GB" sz="6000" dirty="0">
               <a:solidFill>
@@ -7639,7 +7639,7 @@
         </p:blipFill>
         <p:spPr>
           <a:xfrm>
-            <a:off x="6930720" y="6336062"/>
+            <a:off x="7787970" y="5467350"/>
             <a:ext cx="1041400" cy="495300"/>
           </a:xfrm>
           <a:prstGeom prst="rect">
@@ -9604,7 +9604,19 @@
               <a:rPr lang="en-GB" sz="3200" dirty="0">
                 <a:latin typeface="+mj-lt"/>
               </a:rPr>
-              <a:t>Understanding the basic mechanics of TDD</a:t>
+              <a:t>Understanding the basic </a:t>
+            </a:r>
+            <a:r>
+              <a:rPr lang="en-GB" sz="3200" b="1" dirty="0">
+                <a:latin typeface="+mj-lt"/>
+              </a:rPr>
+              <a:t>mechanics</a:t>
+            </a:r>
+            <a:r>
+              <a:rPr lang="en-GB" sz="3200" dirty="0">
+                <a:latin typeface="+mj-lt"/>
+              </a:rPr>
+              <a:t> of TDD</a:t>
             </a:r>
           </a:p>
           <a:p>
@@ -9619,7 +9631,13 @@
               <a:rPr lang="en-GB" sz="3200" dirty="0">
                 <a:latin typeface="+mj-lt"/>
               </a:rPr>
-              <a:t>Understanding the power of Pair Programming</a:t>
+              <a:t>Understanding the power of </a:t>
+            </a:r>
+            <a:r>
+              <a:rPr lang="en-GB" sz="3200" b="1" dirty="0">
+                <a:latin typeface="+mj-lt"/>
+              </a:rPr>
+              <a:t>Pair Programming</a:t>
             </a:r>
           </a:p>
           <a:p>
@@ -10850,6 +10868,102 @@
           <a:chExt cx="0" cy="0"/>
         </a:xfrm>
       </p:grpSpPr>
+      <p:sp>
+        <p:nvSpPr>
+          <p:cNvPr id="8" name="TextBox 7">
+            <a:extLst>
+              <a:ext uri="{FF2B5EF4-FFF2-40B4-BE49-F238E27FC236}">
+                <a16:creationId xmlns:a16="http://schemas.microsoft.com/office/drawing/2014/main" id="{5C19AAB3-F4DF-3A48-B6C7-7B8CE2727C93}"/>
+              </a:ext>
+            </a:extLst>
+          </p:cNvPr>
+          <p:cNvSpPr txBox="1"/>
+          <p:nvPr/>
+        </p:nvSpPr>
+        <p:spPr>
+          <a:xfrm>
+            <a:off x="10808894" y="1551563"/>
+            <a:ext cx="1075936" cy="2646878"/>
+          </a:xfrm>
+          <a:prstGeom prst="rect">
+            <a:avLst/>
+          </a:prstGeom>
+          <a:noFill/>
+        </p:spPr>
+        <p:txBody>
+          <a:bodyPr wrap="none" rtlCol="0">
+            <a:spAutoFit/>
+          </a:bodyPr>
+          <a:lstStyle/>
+          <a:p>
+            <a:r>
+              <a:rPr lang="en-GB" sz="16600" dirty="0">
+                <a:solidFill>
+                  <a:schemeClr val="bg2">
+                    <a:lumMod val="75000"/>
+                  </a:schemeClr>
+                </a:solidFill>
+              </a:rPr>
+              <a:t>”</a:t>
+            </a:r>
+            <a:endParaRPr lang="en-GB" sz="9600" dirty="0">
+              <a:solidFill>
+                <a:schemeClr val="bg2">
+                  <a:lumMod val="75000"/>
+                </a:schemeClr>
+              </a:solidFill>
+            </a:endParaRPr>
+          </a:p>
+        </p:txBody>
+      </p:sp>
+      <p:sp>
+        <p:nvSpPr>
+          <p:cNvPr id="5" name="TextBox 4">
+            <a:extLst>
+              <a:ext uri="{FF2B5EF4-FFF2-40B4-BE49-F238E27FC236}">
+                <a16:creationId xmlns:a16="http://schemas.microsoft.com/office/drawing/2014/main" id="{66611862-8BDC-0940-B2CF-248BEC0E2899}"/>
+              </a:ext>
+            </a:extLst>
+          </p:cNvPr>
+          <p:cNvSpPr txBox="1"/>
+          <p:nvPr/>
+        </p:nvSpPr>
+        <p:spPr>
+          <a:xfrm>
+            <a:off x="100011" y="-166688"/>
+            <a:ext cx="1075936" cy="2646878"/>
+          </a:xfrm>
+          <a:prstGeom prst="rect">
+            <a:avLst/>
+          </a:prstGeom>
+          <a:noFill/>
+        </p:spPr>
+        <p:txBody>
+          <a:bodyPr wrap="none" rtlCol="0">
+            <a:spAutoFit/>
+          </a:bodyPr>
+          <a:lstStyle/>
+          <a:p>
+            <a:r>
+              <a:rPr lang="en-GB" sz="16600" dirty="0">
+                <a:solidFill>
+                  <a:schemeClr val="bg2">
+                    <a:lumMod val="75000"/>
+                  </a:schemeClr>
+                </a:solidFill>
+              </a:rPr>
+              <a:t>“</a:t>
+            </a:r>
+            <a:endParaRPr lang="en-GB" sz="9600" dirty="0">
+              <a:solidFill>
+                <a:schemeClr val="bg2">
+                  <a:lumMod val="75000"/>
+                </a:schemeClr>
+              </a:solidFill>
+            </a:endParaRPr>
+          </a:p>
+        </p:txBody>
+      </p:sp>
       <p:pic>
         <p:nvPicPr>
           <p:cNvPr id="2" name="Picture 1">
@@ -10900,8 +11014,8 @@
         </p:nvSpPr>
         <p:spPr>
           <a:xfrm>
-            <a:off x="1650094" y="566678"/>
-            <a:ext cx="9585551" cy="2862322"/>
+            <a:off x="942976" y="566678"/>
+            <a:ext cx="10292670" cy="2308324"/>
           </a:xfrm>
           <a:prstGeom prst="rect">
             <a:avLst/>
@@ -10914,108 +11028,100 @@
           <a:lstStyle/>
           <a:p>
             <a:r>
-              <a:rPr lang="en-GB" sz="3600" dirty="0">
-                <a:latin typeface="Segoe WP Light" panose="020B0502040204020203" pitchFamily="34" charset="0"/>
+              <a:rPr lang="en-GB" sz="3600" b="1" dirty="0">
+                <a:latin typeface="+mj-lt"/>
                 <a:ea typeface="MS Mincho" panose="02020609040205080304" pitchFamily="49" charset="-128"/>
                 <a:cs typeface="Segoe WP Light" panose="020B0502040204020203" pitchFamily="34" charset="0"/>
               </a:rPr>
-              <a:t>“</a:t>
-            </a:r>
-            <a:r>
-              <a:rPr lang="en-GB" sz="3600" b="1" dirty="0">
-                <a:latin typeface="Segoe WP Light" panose="020B0502040204020203" pitchFamily="34" charset="0"/>
+              <a:t>Inspection </a:t>
+            </a:r>
+            <a:r>
+              <a:rPr lang="en-GB" sz="3600" dirty="0">
+                <a:latin typeface="+mj-lt"/>
                 <a:ea typeface="MS Mincho" panose="02020609040205080304" pitchFamily="49" charset="-128"/>
                 <a:cs typeface="Segoe WP Light" panose="020B0502040204020203" pitchFamily="34" charset="0"/>
               </a:rPr>
-              <a:t>Inspection </a:t>
-            </a:r>
-            <a:r>
-              <a:rPr lang="en-GB" sz="3600" dirty="0">
-                <a:latin typeface="Segoe WP Light" panose="020B0502040204020203" pitchFamily="34" charset="0"/>
+              <a:t>does</a:t>
+            </a:r>
+            <a:r>
+              <a:rPr lang="en-GB" sz="3600" b="1" dirty="0">
+                <a:latin typeface="+mj-lt"/>
                 <a:ea typeface="MS Mincho" panose="02020609040205080304" pitchFamily="49" charset="-128"/>
                 <a:cs typeface="Segoe WP Light" panose="020B0502040204020203" pitchFamily="34" charset="0"/>
               </a:rPr>
-              <a:t>does</a:t>
-            </a:r>
-            <a:r>
-              <a:rPr lang="en-GB" sz="3600" b="1" dirty="0">
-                <a:latin typeface="Segoe WP Light" panose="020B0502040204020203" pitchFamily="34" charset="0"/>
+              <a:t> not improve </a:t>
+            </a:r>
+            <a:r>
+              <a:rPr lang="en-GB" sz="3600" dirty="0">
+                <a:latin typeface="+mj-lt"/>
                 <a:ea typeface="MS Mincho" panose="02020609040205080304" pitchFamily="49" charset="-128"/>
                 <a:cs typeface="Segoe WP Light" panose="020B0502040204020203" pitchFamily="34" charset="0"/>
               </a:rPr>
-              <a:t> not improve </a:t>
-            </a:r>
-            <a:r>
-              <a:rPr lang="en-GB" sz="3600" dirty="0">
-                <a:latin typeface="Segoe WP Light" panose="020B0502040204020203" pitchFamily="34" charset="0"/>
+              <a:t>the</a:t>
+            </a:r>
+            <a:r>
+              <a:rPr lang="en-GB" sz="3600" b="1" dirty="0">
+                <a:latin typeface="+mj-lt"/>
                 <a:ea typeface="MS Mincho" panose="02020609040205080304" pitchFamily="49" charset="-128"/>
                 <a:cs typeface="Segoe WP Light" panose="020B0502040204020203" pitchFamily="34" charset="0"/>
               </a:rPr>
-              <a:t>the</a:t>
-            </a:r>
-            <a:r>
-              <a:rPr lang="en-GB" sz="3600" b="1" dirty="0">
-                <a:latin typeface="Segoe WP Light" panose="020B0502040204020203" pitchFamily="34" charset="0"/>
+              <a:t> </a:t>
+            </a:r>
+            <a:r>
+              <a:rPr lang="en-GB" sz="3600" dirty="0">
+                <a:latin typeface="+mj-lt"/>
                 <a:ea typeface="MS Mincho" panose="02020609040205080304" pitchFamily="49" charset="-128"/>
                 <a:cs typeface="Segoe WP Light" panose="020B0502040204020203" pitchFamily="34" charset="0"/>
               </a:rPr>
-              <a:t> </a:t>
-            </a:r>
-            <a:r>
-              <a:rPr lang="en-GB" sz="3600" dirty="0">
-                <a:latin typeface="Segoe WP Light" panose="020B0502040204020203" pitchFamily="34" charset="0"/>
+              <a:t>quality, </a:t>
+            </a:r>
+            <a:r>
+              <a:rPr lang="en-GB" sz="3600" b="1" dirty="0">
+                <a:latin typeface="+mj-lt"/>
                 <a:ea typeface="MS Mincho" panose="02020609040205080304" pitchFamily="49" charset="-128"/>
                 <a:cs typeface="Segoe WP Light" panose="020B0502040204020203" pitchFamily="34" charset="0"/>
               </a:rPr>
-              <a:t>quality, </a:t>
-            </a:r>
-            <a:r>
-              <a:rPr lang="en-GB" sz="3600" b="1" dirty="0">
-                <a:latin typeface="Segoe WP Light" panose="020B0502040204020203" pitchFamily="34" charset="0"/>
+              <a:t>nor guarantee quality</a:t>
+            </a:r>
+            <a:r>
+              <a:rPr lang="en-GB" sz="3600" dirty="0">
+                <a:latin typeface="+mj-lt"/>
                 <a:ea typeface="MS Mincho" panose="02020609040205080304" pitchFamily="49" charset="-128"/>
                 <a:cs typeface="Segoe WP Light" panose="020B0502040204020203" pitchFamily="34" charset="0"/>
               </a:rPr>
-              <a:t>nor guarantee quality</a:t>
-            </a:r>
-            <a:r>
-              <a:rPr lang="en-GB" sz="3600" dirty="0">
-                <a:latin typeface="Segoe WP Light" panose="020B0502040204020203" pitchFamily="34" charset="0"/>
+              <a:t>. Inspection is </a:t>
+            </a:r>
+            <a:r>
+              <a:rPr lang="en-GB" sz="3600" b="1" dirty="0">
+                <a:latin typeface="+mj-lt"/>
                 <a:ea typeface="MS Mincho" panose="02020609040205080304" pitchFamily="49" charset="-128"/>
                 <a:cs typeface="Segoe WP Light" panose="020B0502040204020203" pitchFamily="34" charset="0"/>
               </a:rPr>
-              <a:t>. Inspection is </a:t>
-            </a:r>
-            <a:r>
-              <a:rPr lang="en-GB" sz="3600" b="1" dirty="0">
-                <a:latin typeface="Segoe WP Light" panose="020B0502040204020203" pitchFamily="34" charset="0"/>
+              <a:t>too late</a:t>
+            </a:r>
+            <a:r>
+              <a:rPr lang="en-GB" sz="3600" dirty="0">
+                <a:latin typeface="+mj-lt"/>
                 <a:ea typeface="MS Mincho" panose="02020609040205080304" pitchFamily="49" charset="-128"/>
                 <a:cs typeface="Segoe WP Light" panose="020B0502040204020203" pitchFamily="34" charset="0"/>
               </a:rPr>
-              <a:t>too late</a:t>
-            </a:r>
-            <a:r>
-              <a:rPr lang="en-GB" sz="3600" dirty="0">
-                <a:latin typeface="Segoe WP Light" panose="020B0502040204020203" pitchFamily="34" charset="0"/>
+              <a:t>. The quality, good or bad, is already in the product. As Harold F. Dodge said, ‘</a:t>
+            </a:r>
+            <a:r>
+              <a:rPr lang="en-GB" sz="3600" b="1" dirty="0">
+                <a:latin typeface="+mj-lt"/>
                 <a:ea typeface="MS Mincho" panose="02020609040205080304" pitchFamily="49" charset="-128"/>
                 <a:cs typeface="Segoe WP Light" panose="020B0502040204020203" pitchFamily="34" charset="0"/>
               </a:rPr>
-              <a:t>. The quality, good or bad, is already in the product. As Harold F. Dodge said, ‘</a:t>
-            </a:r>
-            <a:r>
-              <a:rPr lang="en-GB" sz="3600" b="1" dirty="0">
-                <a:latin typeface="Segoe WP Light" panose="020B0502040204020203" pitchFamily="34" charset="0"/>
+              <a:t>You cannot inspect quality into a product</a:t>
+            </a:r>
+            <a:r>
+              <a:rPr lang="en-GB" sz="3600" dirty="0">
+                <a:latin typeface="+mj-lt"/>
                 <a:ea typeface="MS Mincho" panose="02020609040205080304" pitchFamily="49" charset="-128"/>
                 <a:cs typeface="Segoe WP Light" panose="020B0502040204020203" pitchFamily="34" charset="0"/>
               </a:rPr>
-              <a:t>You cannot inspect quality into a product</a:t>
-            </a:r>
-            <a:r>
-              <a:rPr lang="en-GB" sz="3600" dirty="0">
-                <a:latin typeface="Segoe WP Light" panose="020B0502040204020203" pitchFamily="34" charset="0"/>
-                <a:ea typeface="MS Mincho" panose="02020609040205080304" pitchFamily="49" charset="-128"/>
-                <a:cs typeface="Segoe WP Light" panose="020B0502040204020203" pitchFamily="34" charset="0"/>
-              </a:rPr>
-              <a:t>.’”</a:t>
+              <a:t>.’</a:t>
             </a:r>
           </a:p>
         </p:txBody>
@@ -11034,8 +11140,8 @@
         </p:nvSpPr>
         <p:spPr>
           <a:xfrm>
-            <a:off x="1650094" y="3913795"/>
-            <a:ext cx="3613874" cy="1077218"/>
+            <a:off x="942976" y="3770920"/>
+            <a:ext cx="3464603" cy="1077218"/>
           </a:xfrm>
           <a:prstGeom prst="rect">
             <a:avLst/>
@@ -11048,17 +11154,17 @@
           <a:lstStyle/>
           <a:p>
             <a:r>
+              <a:rPr lang="en-GB" sz="3200" b="1" i="1" dirty="0">
+                <a:latin typeface="+mj-lt"/>
+                <a:cs typeface="Segoe WP Light" panose="020B0502040204020203" pitchFamily="34" charset="0"/>
+              </a:rPr>
+              <a:t>W. Edwards Deming</a:t>
+            </a:r>
+          </a:p>
+          <a:p>
+            <a:r>
               <a:rPr lang="en-GB" sz="3200" i="1" dirty="0">
-                <a:latin typeface="Segoe WP Light" panose="020B0502040204020203" pitchFamily="34" charset="0"/>
-                <a:cs typeface="Segoe WP Light" panose="020B0502040204020203" pitchFamily="34" charset="0"/>
-              </a:rPr>
-              <a:t>W. Edwards Deming</a:t>
-            </a:r>
-          </a:p>
-          <a:p>
-            <a:r>
-              <a:rPr lang="en-GB" sz="3200" i="1" dirty="0">
-                <a:latin typeface="Segoe WP Light" panose="020B0502040204020203" pitchFamily="34" charset="0"/>
+                <a:latin typeface="+mj-lt"/>
                 <a:cs typeface="Segoe WP Light" panose="020B0502040204020203" pitchFamily="34" charset="0"/>
               </a:rPr>
               <a:t>Out of the Crisis</a:t>

</xml_diff>